<commit_message>
Delete the old version, re-time the new version
</commit_message>
<xml_diff>
--- a/Minute madness Hyperted_v2.pptx
+++ b/Minute madness Hyperted_v2.pptx
@@ -192,7 +192,8 @@
           <a:p>
             <a:fld id="{F8667B66-B7A1-6A48-9C07-256C8B900229}" type="datetimeFigureOut">
               <a:rPr lang="en-US" smtClean="0"/>
-              <a:t>10/7/14</a:t>
+              <a:pPr/>
+              <a:t>10/8/2014</a:t>
             </a:fld>
             <a:endParaRPr lang="en-US"/>
           </a:p>
@@ -351,6 +352,7 @@
           <a:p>
             <a:fld id="{28170322-F065-7842-9F60-7EB067E88005}" type="slidenum">
               <a:rPr lang="en-US" smtClean="0"/>
+              <a:pPr/>
               <a:t>‹#›</a:t>
             </a:fld>
             <a:endParaRPr lang="en-US"/>
@@ -360,7 +362,7 @@
     </p:spTree>
     <p:extLst>
       <p:ext uri="{BB962C8B-B14F-4D97-AF65-F5344CB8AC3E}">
-        <p14:creationId xmlns:p14="http://schemas.microsoft.com/office/powerpoint/2010/main" val="905987665"/>
+        <p14:creationId xmlns:p14="http://schemas.microsoft.com/office/powerpoint/2010/main" xmlns="" val="905987665"/>
       </p:ext>
     </p:extLst>
   </p:cSld>
@@ -525,6 +527,7 @@
           <a:p>
             <a:fld id="{28170322-F065-7842-9F60-7EB067E88005}" type="slidenum">
               <a:rPr lang="en-US" smtClean="0"/>
+              <a:pPr/>
               <a:t>1</a:t>
             </a:fld>
             <a:endParaRPr lang="en-US"/>
@@ -534,7 +537,7 @@
     </p:spTree>
     <p:extLst>
       <p:ext uri="{BB962C8B-B14F-4D97-AF65-F5344CB8AC3E}">
-        <p14:creationId xmlns:p14="http://schemas.microsoft.com/office/powerpoint/2010/main" val="244086570"/>
+        <p14:creationId xmlns:p14="http://schemas.microsoft.com/office/powerpoint/2010/main" xmlns="" val="244086570"/>
       </p:ext>
     </p:extLst>
   </p:cSld>
@@ -725,7 +728,8 @@
           <a:p>
             <a:fld id="{A77706AE-1A74-6C43-87CD-B80583897333}" type="datetimeFigureOut">
               <a:rPr lang="en-US" smtClean="0"/>
-              <a:t>10/5/14</a:t>
+              <a:pPr/>
+              <a:t>10/8/2014</a:t>
             </a:fld>
             <a:endParaRPr lang="en-US"/>
           </a:p>
@@ -767,6 +771,7 @@
           <a:p>
             <a:fld id="{7DEA3C7C-5D88-E940-A1D8-C7951660722A}" type="slidenum">
               <a:rPr lang="en-US" smtClean="0"/>
+              <a:pPr/>
               <a:t>‹#›</a:t>
             </a:fld>
             <a:endParaRPr lang="en-US"/>
@@ -776,7 +781,7 @@
     </p:spTree>
     <p:extLst>
       <p:ext uri="{BB962C8B-B14F-4D97-AF65-F5344CB8AC3E}">
-        <p14:creationId xmlns:p14="http://schemas.microsoft.com/office/powerpoint/2010/main" val="2256975840"/>
+        <p14:creationId xmlns:p14="http://schemas.microsoft.com/office/powerpoint/2010/main" xmlns="" val="2256975840"/>
       </p:ext>
     </p:extLst>
   </p:cSld>
@@ -895,7 +900,8 @@
           <a:p>
             <a:fld id="{A77706AE-1A74-6C43-87CD-B80583897333}" type="datetimeFigureOut">
               <a:rPr lang="en-US" smtClean="0"/>
-              <a:t>10/5/14</a:t>
+              <a:pPr/>
+              <a:t>10/8/2014</a:t>
             </a:fld>
             <a:endParaRPr lang="en-US"/>
           </a:p>
@@ -937,6 +943,7 @@
           <a:p>
             <a:fld id="{7DEA3C7C-5D88-E940-A1D8-C7951660722A}" type="slidenum">
               <a:rPr lang="en-US" smtClean="0"/>
+              <a:pPr/>
               <a:t>‹#›</a:t>
             </a:fld>
             <a:endParaRPr lang="en-US"/>
@@ -946,7 +953,7 @@
     </p:spTree>
     <p:extLst>
       <p:ext uri="{BB962C8B-B14F-4D97-AF65-F5344CB8AC3E}">
-        <p14:creationId xmlns:p14="http://schemas.microsoft.com/office/powerpoint/2010/main" val="3178761856"/>
+        <p14:creationId xmlns:p14="http://schemas.microsoft.com/office/powerpoint/2010/main" xmlns="" val="3178761856"/>
       </p:ext>
     </p:extLst>
   </p:cSld>
@@ -1075,7 +1082,8 @@
           <a:p>
             <a:fld id="{A77706AE-1A74-6C43-87CD-B80583897333}" type="datetimeFigureOut">
               <a:rPr lang="en-US" smtClean="0"/>
-              <a:t>10/5/14</a:t>
+              <a:pPr/>
+              <a:t>10/8/2014</a:t>
             </a:fld>
             <a:endParaRPr lang="en-US"/>
           </a:p>
@@ -1117,6 +1125,7 @@
           <a:p>
             <a:fld id="{7DEA3C7C-5D88-E940-A1D8-C7951660722A}" type="slidenum">
               <a:rPr lang="en-US" smtClean="0"/>
+              <a:pPr/>
               <a:t>‹#›</a:t>
             </a:fld>
             <a:endParaRPr lang="en-US"/>
@@ -1126,7 +1135,7 @@
     </p:spTree>
     <p:extLst>
       <p:ext uri="{BB962C8B-B14F-4D97-AF65-F5344CB8AC3E}">
-        <p14:creationId xmlns:p14="http://schemas.microsoft.com/office/powerpoint/2010/main" val="932478683"/>
+        <p14:creationId xmlns:p14="http://schemas.microsoft.com/office/powerpoint/2010/main" xmlns="" val="932478683"/>
       </p:ext>
     </p:extLst>
   </p:cSld>
@@ -1245,7 +1254,8 @@
           <a:p>
             <a:fld id="{A77706AE-1A74-6C43-87CD-B80583897333}" type="datetimeFigureOut">
               <a:rPr lang="en-US" smtClean="0"/>
-              <a:t>10/5/14</a:t>
+              <a:pPr/>
+              <a:t>10/8/2014</a:t>
             </a:fld>
             <a:endParaRPr lang="en-US"/>
           </a:p>
@@ -1287,6 +1297,7 @@
           <a:p>
             <a:fld id="{7DEA3C7C-5D88-E940-A1D8-C7951660722A}" type="slidenum">
               <a:rPr lang="en-US" smtClean="0"/>
+              <a:pPr/>
               <a:t>‹#›</a:t>
             </a:fld>
             <a:endParaRPr lang="en-US"/>
@@ -1296,7 +1307,7 @@
     </p:spTree>
     <p:extLst>
       <p:ext uri="{BB962C8B-B14F-4D97-AF65-F5344CB8AC3E}">
-        <p14:creationId xmlns:p14="http://schemas.microsoft.com/office/powerpoint/2010/main" val="3271724691"/>
+        <p14:creationId xmlns:p14="http://schemas.microsoft.com/office/powerpoint/2010/main" xmlns="" val="3271724691"/>
       </p:ext>
     </p:extLst>
   </p:cSld>
@@ -1491,7 +1502,8 @@
           <a:p>
             <a:fld id="{A77706AE-1A74-6C43-87CD-B80583897333}" type="datetimeFigureOut">
               <a:rPr lang="en-US" smtClean="0"/>
-              <a:t>10/5/14</a:t>
+              <a:pPr/>
+              <a:t>10/8/2014</a:t>
             </a:fld>
             <a:endParaRPr lang="en-US"/>
           </a:p>
@@ -1533,6 +1545,7 @@
           <a:p>
             <a:fld id="{7DEA3C7C-5D88-E940-A1D8-C7951660722A}" type="slidenum">
               <a:rPr lang="en-US" smtClean="0"/>
+              <a:pPr/>
               <a:t>‹#›</a:t>
             </a:fld>
             <a:endParaRPr lang="en-US"/>
@@ -1542,7 +1555,7 @@
     </p:spTree>
     <p:extLst>
       <p:ext uri="{BB962C8B-B14F-4D97-AF65-F5344CB8AC3E}">
-        <p14:creationId xmlns:p14="http://schemas.microsoft.com/office/powerpoint/2010/main" val="3808781694"/>
+        <p14:creationId xmlns:p14="http://schemas.microsoft.com/office/powerpoint/2010/main" xmlns="" val="3808781694"/>
       </p:ext>
     </p:extLst>
   </p:cSld>
@@ -1779,7 +1792,8 @@
           <a:p>
             <a:fld id="{A77706AE-1A74-6C43-87CD-B80583897333}" type="datetimeFigureOut">
               <a:rPr lang="en-US" smtClean="0"/>
-              <a:t>10/5/14</a:t>
+              <a:pPr/>
+              <a:t>10/8/2014</a:t>
             </a:fld>
             <a:endParaRPr lang="en-US"/>
           </a:p>
@@ -1821,6 +1835,7 @@
           <a:p>
             <a:fld id="{7DEA3C7C-5D88-E940-A1D8-C7951660722A}" type="slidenum">
               <a:rPr lang="en-US" smtClean="0"/>
+              <a:pPr/>
               <a:t>‹#›</a:t>
             </a:fld>
             <a:endParaRPr lang="en-US"/>
@@ -1830,7 +1845,7 @@
     </p:spTree>
     <p:extLst>
       <p:ext uri="{BB962C8B-B14F-4D97-AF65-F5344CB8AC3E}">
-        <p14:creationId xmlns:p14="http://schemas.microsoft.com/office/powerpoint/2010/main" val="2936630494"/>
+        <p14:creationId xmlns:p14="http://schemas.microsoft.com/office/powerpoint/2010/main" xmlns="" val="2936630494"/>
       </p:ext>
     </p:extLst>
   </p:cSld>
@@ -2201,7 +2216,8 @@
           <a:p>
             <a:fld id="{A77706AE-1A74-6C43-87CD-B80583897333}" type="datetimeFigureOut">
               <a:rPr lang="en-US" smtClean="0"/>
-              <a:t>10/5/14</a:t>
+              <a:pPr/>
+              <a:t>10/8/2014</a:t>
             </a:fld>
             <a:endParaRPr lang="en-US"/>
           </a:p>
@@ -2243,6 +2259,7 @@
           <a:p>
             <a:fld id="{7DEA3C7C-5D88-E940-A1D8-C7951660722A}" type="slidenum">
               <a:rPr lang="en-US" smtClean="0"/>
+              <a:pPr/>
               <a:t>‹#›</a:t>
             </a:fld>
             <a:endParaRPr lang="en-US"/>
@@ -2252,7 +2269,7 @@
     </p:spTree>
     <p:extLst>
       <p:ext uri="{BB962C8B-B14F-4D97-AF65-F5344CB8AC3E}">
-        <p14:creationId xmlns:p14="http://schemas.microsoft.com/office/powerpoint/2010/main" val="1883566783"/>
+        <p14:creationId xmlns:p14="http://schemas.microsoft.com/office/powerpoint/2010/main" xmlns="" val="1883566783"/>
       </p:ext>
     </p:extLst>
   </p:cSld>
@@ -2319,7 +2336,8 @@
           <a:p>
             <a:fld id="{A77706AE-1A74-6C43-87CD-B80583897333}" type="datetimeFigureOut">
               <a:rPr lang="en-US" smtClean="0"/>
-              <a:t>10/5/14</a:t>
+              <a:pPr/>
+              <a:t>10/8/2014</a:t>
             </a:fld>
             <a:endParaRPr lang="en-US"/>
           </a:p>
@@ -2361,6 +2379,7 @@
           <a:p>
             <a:fld id="{7DEA3C7C-5D88-E940-A1D8-C7951660722A}" type="slidenum">
               <a:rPr lang="en-US" smtClean="0"/>
+              <a:pPr/>
               <a:t>‹#›</a:t>
             </a:fld>
             <a:endParaRPr lang="en-US"/>
@@ -2370,7 +2389,7 @@
     </p:spTree>
     <p:extLst>
       <p:ext uri="{BB962C8B-B14F-4D97-AF65-F5344CB8AC3E}">
-        <p14:creationId xmlns:p14="http://schemas.microsoft.com/office/powerpoint/2010/main" val="3855280951"/>
+        <p14:creationId xmlns:p14="http://schemas.microsoft.com/office/powerpoint/2010/main" xmlns="" val="3855280951"/>
       </p:ext>
     </p:extLst>
   </p:cSld>
@@ -2414,7 +2433,8 @@
           <a:p>
             <a:fld id="{A77706AE-1A74-6C43-87CD-B80583897333}" type="datetimeFigureOut">
               <a:rPr lang="en-US" smtClean="0"/>
-              <a:t>10/5/14</a:t>
+              <a:pPr/>
+              <a:t>10/8/2014</a:t>
             </a:fld>
             <a:endParaRPr lang="en-US"/>
           </a:p>
@@ -2456,6 +2476,7 @@
           <a:p>
             <a:fld id="{7DEA3C7C-5D88-E940-A1D8-C7951660722A}" type="slidenum">
               <a:rPr lang="en-US" smtClean="0"/>
+              <a:pPr/>
               <a:t>‹#›</a:t>
             </a:fld>
             <a:endParaRPr lang="en-US"/>
@@ -2465,7 +2486,7 @@
     </p:spTree>
     <p:extLst>
       <p:ext uri="{BB962C8B-B14F-4D97-AF65-F5344CB8AC3E}">
-        <p14:creationId xmlns:p14="http://schemas.microsoft.com/office/powerpoint/2010/main" val="3553539345"/>
+        <p14:creationId xmlns:p14="http://schemas.microsoft.com/office/powerpoint/2010/main" xmlns="" val="3553539345"/>
       </p:ext>
     </p:extLst>
   </p:cSld>
@@ -2691,7 +2712,8 @@
           <a:p>
             <a:fld id="{A77706AE-1A74-6C43-87CD-B80583897333}" type="datetimeFigureOut">
               <a:rPr lang="en-US" smtClean="0"/>
-              <a:t>10/5/14</a:t>
+              <a:pPr/>
+              <a:t>10/8/2014</a:t>
             </a:fld>
             <a:endParaRPr lang="en-US"/>
           </a:p>
@@ -2733,6 +2755,7 @@
           <a:p>
             <a:fld id="{7DEA3C7C-5D88-E940-A1D8-C7951660722A}" type="slidenum">
               <a:rPr lang="en-US" smtClean="0"/>
+              <a:pPr/>
               <a:t>‹#›</a:t>
             </a:fld>
             <a:endParaRPr lang="en-US"/>
@@ -2742,7 +2765,7 @@
     </p:spTree>
     <p:extLst>
       <p:ext uri="{BB962C8B-B14F-4D97-AF65-F5344CB8AC3E}">
-        <p14:creationId xmlns:p14="http://schemas.microsoft.com/office/powerpoint/2010/main" val="1969851043"/>
+        <p14:creationId xmlns:p14="http://schemas.microsoft.com/office/powerpoint/2010/main" xmlns="" val="1969851043"/>
       </p:ext>
     </p:extLst>
   </p:cSld>
@@ -2944,7 +2967,8 @@
           <a:p>
             <a:fld id="{A77706AE-1A74-6C43-87CD-B80583897333}" type="datetimeFigureOut">
               <a:rPr lang="en-US" smtClean="0"/>
-              <a:t>10/5/14</a:t>
+              <a:pPr/>
+              <a:t>10/8/2014</a:t>
             </a:fld>
             <a:endParaRPr lang="en-US"/>
           </a:p>
@@ -2986,6 +3010,7 @@
           <a:p>
             <a:fld id="{7DEA3C7C-5D88-E940-A1D8-C7951660722A}" type="slidenum">
               <a:rPr lang="en-US" smtClean="0"/>
+              <a:pPr/>
               <a:t>‹#›</a:t>
             </a:fld>
             <a:endParaRPr lang="en-US"/>
@@ -2995,7 +3020,7 @@
     </p:spTree>
     <p:extLst>
       <p:ext uri="{BB962C8B-B14F-4D97-AF65-F5344CB8AC3E}">
-        <p14:creationId xmlns:p14="http://schemas.microsoft.com/office/powerpoint/2010/main" val="2649511041"/>
+        <p14:creationId xmlns:p14="http://schemas.microsoft.com/office/powerpoint/2010/main" xmlns="" val="2649511041"/>
       </p:ext>
     </p:extLst>
   </p:cSld>
@@ -3157,7 +3182,8 @@
           <a:p>
             <a:fld id="{A77706AE-1A74-6C43-87CD-B80583897333}" type="datetimeFigureOut">
               <a:rPr lang="en-US" smtClean="0"/>
-              <a:t>10/5/14</a:t>
+              <a:pPr/>
+              <a:t>10/8/2014</a:t>
             </a:fld>
             <a:endParaRPr lang="en-US"/>
           </a:p>
@@ -3235,6 +3261,7 @@
           <a:p>
             <a:fld id="{7DEA3C7C-5D88-E940-A1D8-C7951660722A}" type="slidenum">
               <a:rPr lang="en-US" smtClean="0"/>
+              <a:pPr/>
               <a:t>‹#›</a:t>
             </a:fld>
             <a:endParaRPr lang="en-US"/>
@@ -3244,7 +3271,7 @@
     </p:spTree>
     <p:extLst>
       <p:ext uri="{BB962C8B-B14F-4D97-AF65-F5344CB8AC3E}">
-        <p14:creationId xmlns:p14="http://schemas.microsoft.com/office/powerpoint/2010/main" val="1918724144"/>
+        <p14:creationId xmlns:p14="http://schemas.microsoft.com/office/powerpoint/2010/main" xmlns="" val="1918724144"/>
       </p:ext>
     </p:extLst>
   </p:cSld>
@@ -3558,7 +3585,7 @@
             <a:blip r:embed="rId3">
               <a:extLst>
                 <a:ext uri="{28A0092B-C50C-407E-A947-70E740481C1C}">
-                  <a14:useLocalDpi xmlns:a14="http://schemas.microsoft.com/office/drawing/2010/main" val="0"/>
+                  <a14:useLocalDpi xmlns:a14="http://schemas.microsoft.com/office/drawing/2010/main" xmlns="" val="0"/>
                 </a:ext>
               </a:extLst>
             </a:blip>
@@ -3672,7 +3699,7 @@
             <a:blip r:embed="rId5">
               <a:extLst>
                 <a:ext uri="{BEBA8EAE-BF5A-486C-A8C5-ECC9F3942E4B}">
-                  <a14:imgProps xmlns:a14="http://schemas.microsoft.com/office/drawing/2010/main">
+                  <a14:imgProps xmlns:a14="http://schemas.microsoft.com/office/drawing/2010/main" xmlns="">
                     <a14:imgLayer r:embed="rId6">
                       <a14:imgEffect>
                         <a14:brightnessContrast bright="-40000" contrast="40000"/>
@@ -3864,7 +3891,7 @@
             <a:blip r:embed="rId7">
               <a:extLst>
                 <a:ext uri="{28A0092B-C50C-407E-A947-70E740481C1C}">
-                  <a14:useLocalDpi xmlns:a14="http://schemas.microsoft.com/office/drawing/2010/main" val="0"/>
+                  <a14:useLocalDpi xmlns:a14="http://schemas.microsoft.com/office/drawing/2010/main" xmlns="" val="0"/>
                 </a:ext>
               </a:extLst>
             </a:blip>
@@ -4118,11 +4145,6 @@
                 </a:rPr>
                 <a:t>2014</a:t>
               </a:r>
-              <a:endParaRPr lang="en-US" sz="6600" dirty="0">
-                <a:solidFill>
-                  <a:srgbClr val="000000"/>
-                </a:solidFill>
-              </a:endParaRPr>
             </a:p>
           </p:txBody>
         </p:sp>
@@ -4138,7 +4160,7 @@
             <a:blip r:embed="rId8">
               <a:extLst>
                 <a:ext uri="{28A0092B-C50C-407E-A947-70E740481C1C}">
-                  <a14:useLocalDpi xmlns:a14="http://schemas.microsoft.com/office/drawing/2010/main" val="0"/>
+                  <a14:useLocalDpi xmlns:a14="http://schemas.microsoft.com/office/drawing/2010/main" xmlns="" val="0"/>
                 </a:ext>
               </a:extLst>
             </a:blip>
@@ -4251,7 +4273,7 @@
             <a:blip r:embed="rId9">
               <a:extLst>
                 <a:ext uri="{28A0092B-C50C-407E-A947-70E740481C1C}">
-                  <a14:useLocalDpi xmlns:a14="http://schemas.microsoft.com/office/drawing/2010/main" val="0"/>
+                  <a14:useLocalDpi xmlns:a14="http://schemas.microsoft.com/office/drawing/2010/main" xmlns="" val="0"/>
                 </a:ext>
               </a:extLst>
             </a:blip>
@@ -4333,7 +4355,7 @@
               <a:blip r:embed="rId11">
                 <a:extLst>
                   <a:ext uri="{28A0092B-C50C-407E-A947-70E740481C1C}">
-                    <a14:useLocalDpi xmlns:a14="http://schemas.microsoft.com/office/drawing/2010/main" val="0"/>
+                    <a14:useLocalDpi xmlns:a14="http://schemas.microsoft.com/office/drawing/2010/main" xmlns="" val="0"/>
                   </a:ext>
                 </a:extLst>
               </a:blip>
@@ -4678,7 +4700,7 @@
               <a:blip r:embed="rId13" cstate="print">
                 <a:extLst>
                   <a:ext uri="{28A0092B-C50C-407E-A947-70E740481C1C}">
-                    <a14:useLocalDpi xmlns:a14="http://schemas.microsoft.com/office/drawing/2010/main"/>
+                    <a14:useLocalDpi xmlns:a14="http://schemas.microsoft.com/office/drawing/2010/main" xmlns=""/>
                   </a:ext>
                 </a:extLst>
               </a:blip>
@@ -5060,7 +5082,7 @@
                 <a:blip r:embed="rId17">
                   <a:extLst>
                     <a:ext uri="{28A0092B-C50C-407E-A947-70E740481C1C}">
-                      <a14:useLocalDpi xmlns:a14="http://schemas.microsoft.com/office/drawing/2010/main" val="0"/>
+                      <a14:useLocalDpi xmlns:a14="http://schemas.microsoft.com/office/drawing/2010/main" xmlns="" val="0"/>
                     </a:ext>
                   </a:extLst>
                 </a:blip>
@@ -5094,7 +5116,7 @@
                 <a:blip r:embed="rId8">
                   <a:extLst>
                     <a:ext uri="{28A0092B-C50C-407E-A947-70E740481C1C}">
-                      <a14:useLocalDpi xmlns:a14="http://schemas.microsoft.com/office/drawing/2010/main" val="0"/>
+                      <a14:useLocalDpi xmlns:a14="http://schemas.microsoft.com/office/drawing/2010/main" xmlns="" val="0"/>
                     </a:ext>
                   </a:extLst>
                 </a:blip>
@@ -5210,7 +5232,7 @@
                 <a:blip r:embed="rId17">
                   <a:extLst>
                     <a:ext uri="{28A0092B-C50C-407E-A947-70E740481C1C}">
-                      <a14:useLocalDpi xmlns:a14="http://schemas.microsoft.com/office/drawing/2010/main" val="0"/>
+                      <a14:useLocalDpi xmlns:a14="http://schemas.microsoft.com/office/drawing/2010/main" xmlns="" val="0"/>
                     </a:ext>
                   </a:extLst>
                 </a:blip>
@@ -5244,7 +5266,7 @@
                 <a:blip r:embed="rId8">
                   <a:extLst>
                     <a:ext uri="{28A0092B-C50C-407E-A947-70E740481C1C}">
-                      <a14:useLocalDpi xmlns:a14="http://schemas.microsoft.com/office/drawing/2010/main" val="0"/>
+                      <a14:useLocalDpi xmlns:a14="http://schemas.microsoft.com/office/drawing/2010/main" xmlns="" val="0"/>
                     </a:ext>
                   </a:extLst>
                 </a:blip>
@@ -5360,7 +5382,7 @@
                 <a:blip r:embed="rId17">
                   <a:extLst>
                     <a:ext uri="{28A0092B-C50C-407E-A947-70E740481C1C}">
-                      <a14:useLocalDpi xmlns:a14="http://schemas.microsoft.com/office/drawing/2010/main" val="0"/>
+                      <a14:useLocalDpi xmlns:a14="http://schemas.microsoft.com/office/drawing/2010/main" xmlns="" val="0"/>
                     </a:ext>
                   </a:extLst>
                 </a:blip>
@@ -5394,7 +5416,7 @@
                 <a:blip r:embed="rId8">
                   <a:extLst>
                     <a:ext uri="{28A0092B-C50C-407E-A947-70E740481C1C}">
-                      <a14:useLocalDpi xmlns:a14="http://schemas.microsoft.com/office/drawing/2010/main" val="0"/>
+                      <a14:useLocalDpi xmlns:a14="http://schemas.microsoft.com/office/drawing/2010/main" xmlns="" val="0"/>
                     </a:ext>
                   </a:extLst>
                 </a:blip>
@@ -5597,7 +5619,7 @@
               <a:blip r:embed="rId17">
                 <a:extLst>
                   <a:ext uri="{28A0092B-C50C-407E-A947-70E740481C1C}">
-                    <a14:useLocalDpi xmlns:a14="http://schemas.microsoft.com/office/drawing/2010/main" val="0"/>
+                    <a14:useLocalDpi xmlns:a14="http://schemas.microsoft.com/office/drawing/2010/main" xmlns="" val="0"/>
                   </a:ext>
                 </a:extLst>
               </a:blip>
@@ -6064,7 +6086,7 @@
     </p:spTree>
     <p:extLst>
       <p:ext uri="{BB962C8B-B14F-4D97-AF65-F5344CB8AC3E}">
-        <p14:creationId xmlns:p14="http://schemas.microsoft.com/office/powerpoint/2010/main" val="849729969"/>
+        <p14:creationId xmlns:p14="http://schemas.microsoft.com/office/powerpoint/2010/main" xmlns="" val="849729969"/>
       </p:ext>
     </p:extLst>
   </p:cSld>
@@ -6072,17 +6094,17 @@
     <a:masterClrMapping/>
   </p:clrMapOvr>
   <mc:AlternateContent xmlns:mc="http://schemas.openxmlformats.org/markup-compatibility/2006">
-    <mc:Choice xmlns:p14="http://schemas.microsoft.com/office/powerpoint/2010/main" Requires="p14">
+    <mc:Choice xmlns:p14="http://schemas.microsoft.com/office/powerpoint/2010/main" xmlns="" Requires="p14">
       <p:transition spd="slow" p14:dur="2000" advClick="0" advTm="60000"/>
     </mc:Choice>
     <mc:Fallback>
-      <p:transition xmlns:p14="http://schemas.microsoft.com/office/powerpoint/2010/main" spd="slow" advClick="0" advTm="60000"/>
+      <p:transition spd="slow" advClick="0" advTm="60000"/>
     </mc:Fallback>
   </mc:AlternateContent>
   <p:timing>
     <p:tnLst>
       <p:par>
-        <p:cTn xmlns:p14="http://schemas.microsoft.com/office/powerpoint/2010/main" id="1" dur="indefinite" restart="never" nodeType="tmRoot">
+        <p:cTn id="1" dur="indefinite" restart="never" nodeType="tmRoot">
           <p:childTnLst>
             <p:seq concurrent="1" nextAc="seek">
               <p:cTn id="2" dur="indefinite" nodeType="mainSeq">
@@ -6105,7 +6127,7 @@
                               <p:par>
                                 <p:cTn id="5" presetID="1" presetClass="entr" presetSubtype="0" fill="hold" nodeType="afterEffect">
                                   <p:stCondLst>
-                                    <p:cond delay="17000"/>
+                                    <p:cond delay="12000"/>
                                   </p:stCondLst>
                                   <p:childTnLst>
                                     <p:set>
@@ -6135,7 +6157,7 @@
                         <p:par>
                           <p:cTn id="7" fill="hold">
                             <p:stCondLst>
-                              <p:cond delay="17000"/>
+                              <p:cond delay="12000"/>
                             </p:stCondLst>
                             <p:childTnLst>
                               <p:par>
@@ -6171,7 +6193,7 @@
                         <p:par>
                           <p:cTn id="10" fill="hold">
                             <p:stCondLst>
-                              <p:cond delay="27000"/>
+                              <p:cond delay="22000"/>
                             </p:stCondLst>
                             <p:childTnLst>
                               <p:par>
@@ -6207,7 +6229,7 @@
                         <p:par>
                           <p:cTn id="13" fill="hold">
                             <p:stCondLst>
-                              <p:cond delay="35000"/>
+                              <p:cond delay="30000"/>
                             </p:stCondLst>
                             <p:childTnLst>
                               <p:par>
@@ -6243,7 +6265,7 @@
                         <p:par>
                           <p:cTn id="16" fill="hold">
                             <p:stCondLst>
-                              <p:cond delay="38000"/>
+                              <p:cond delay="33000"/>
                             </p:stCondLst>
                             <p:childTnLst>
                               <p:par>
@@ -6279,7 +6301,7 @@
                         <p:par>
                           <p:cTn id="19" fill="hold">
                             <p:stCondLst>
-                              <p:cond delay="41000"/>
+                              <p:cond delay="36000"/>
                             </p:stCondLst>
                             <p:childTnLst>
                               <p:par>
@@ -6315,7 +6337,7 @@
                         <p:par>
                           <p:cTn id="22" fill="hold">
                             <p:stCondLst>
-                              <p:cond delay="46000"/>
+                              <p:cond delay="41000"/>
                             </p:stCondLst>
                             <p:childTnLst>
                               <p:par>
@@ -6351,7 +6373,7 @@
                         <p:par>
                           <p:cTn id="25" fill="hold">
                             <p:stCondLst>
-                              <p:cond delay="50000"/>
+                              <p:cond delay="45000"/>
                             </p:stCondLst>
                             <p:childTnLst>
                               <p:par>

</xml_diff>